<commit_message>
Fix to ensure the input and output streams to robot are not used at the same time.
</commit_message>
<xml_diff>
--- a/docs/presentation_slides/RoboWarsPresentation.pptx
+++ b/docs/presentation_slides/RoboWarsPresentation.pptx
@@ -15848,7 +15848,7 @@
         </p:blipFill>
         <p:spPr>
           <a:xfrm>
-            <a:off x="1886851" y="1600200"/>
+            <a:off x="1886851" y="1524001"/>
             <a:ext cx="7028549" cy="4800599"/>
           </a:xfrm>
           <a:prstGeom prst="rect">
@@ -15856,6 +15856,69 @@
           </a:prstGeom>
         </p:spPr>
       </p:pic>
+      <p:sp>
+        <p:nvSpPr>
+          <p:cNvPr id="5" name="Rectangle 4"/>
+          <p:cNvSpPr/>
+          <p:nvPr/>
+        </p:nvSpPr>
+        <p:spPr bwMode="auto">
+          <a:xfrm>
+            <a:off x="4267200" y="1600201"/>
+            <a:ext cx="4419600" cy="1524000"/>
+          </a:xfrm>
+          <a:prstGeom prst="rect">
+            <a:avLst/>
+          </a:prstGeom>
+          <a:solidFill>
+            <a:schemeClr val="bg1"/>
+          </a:solidFill>
+          <a:ln w="9525" cap="flat" cmpd="sng" algn="ctr">
+            <a:noFill/>
+            <a:prstDash val="solid"/>
+            <a:round/>
+            <a:headEnd type="none" w="med" len="med"/>
+            <a:tailEnd type="none" w="med" len="med"/>
+          </a:ln>
+          <a:effectLst/>
+        </p:spPr>
+        <p:txBody>
+          <a:bodyPr vert="horz" wrap="square" lIns="91440" tIns="45720" rIns="91440" bIns="45720" numCol="1" rtlCol="0" anchor="t" anchorCtr="0" compatLnSpc="1">
+            <a:prstTxWarp prst="textNoShape">
+              <a:avLst/>
+            </a:prstTxWarp>
+          </a:bodyPr>
+          <a:lstStyle/>
+          <a:p>
+            <a:pPr marL="0" marR="0" indent="0" algn="l" defTabSz="914400" rtl="0" eaLnBrk="0" fontAlgn="base" latinLnBrk="0" hangingPunct="0">
+              <a:lnSpc>
+                <a:spcPct val="100000"/>
+              </a:lnSpc>
+              <a:spcBef>
+                <a:spcPct val="0"/>
+              </a:spcBef>
+              <a:spcAft>
+                <a:spcPct val="0"/>
+              </a:spcAft>
+              <a:buClrTx/>
+              <a:buSzTx/>
+              <a:buFontTx/>
+              <a:buNone/>
+              <a:tabLst/>
+            </a:pPr>
+            <a:endParaRPr kumimoji="0" lang="en-CA" sz="2400" b="0" i="0" u="none" strike="noStrike" cap="none" normalizeH="0" baseline="0" smtClean="0">
+              <a:ln>
+                <a:noFill/>
+              </a:ln>
+              <a:solidFill>
+                <a:schemeClr val="tx1"/>
+              </a:solidFill>
+              <a:effectLst/>
+              <a:latin typeface="Times" pitchFamily="18" charset="0"/>
+            </a:endParaRPr>
+          </a:p>
+        </p:txBody>
+      </p:sp>
     </p:spTree>
   </p:cSld>
   <p:clrMapOvr>

</xml_diff>